<commit_message>
added refs to code
</commit_message>
<xml_diff>
--- a/slides/13-Structs-Unions.pptx
+++ b/slides/13-Structs-Unions.pptx
@@ -14,6 +14,7 @@
     <p:sldId id="262" r:id="rId8"/>
     <p:sldId id="263" r:id="rId9"/>
     <p:sldId id="264" r:id="rId10"/>
+    <p:sldId id="265" r:id="rId11"/>
   </p:sldIdLst>
   <p:sldSz cx="12192000" cy="6858000"/>
   <p:notesSz cx="6858000" cy="9144000"/>
@@ -251,7 +252,7 @@
           <a:p>
             <a:fld id="{FDA4065B-48DF-45A0-8421-A0137D67E07E}" type="datetimeFigureOut">
               <a:rPr lang="en-US" smtClean="0"/>
-              <a:t>10/20/2023</a:t>
+              <a:t>11/18/2023</a:t>
             </a:fld>
             <a:endParaRPr lang="en-US"/>
           </a:p>
@@ -421,7 +422,7 @@
           <a:p>
             <a:fld id="{FDA4065B-48DF-45A0-8421-A0137D67E07E}" type="datetimeFigureOut">
               <a:rPr lang="en-US" smtClean="0"/>
-              <a:t>10/20/2023</a:t>
+              <a:t>11/18/2023</a:t>
             </a:fld>
             <a:endParaRPr lang="en-US"/>
           </a:p>
@@ -601,7 +602,7 @@
           <a:p>
             <a:fld id="{FDA4065B-48DF-45A0-8421-A0137D67E07E}" type="datetimeFigureOut">
               <a:rPr lang="en-US" smtClean="0"/>
-              <a:t>10/20/2023</a:t>
+              <a:t>11/18/2023</a:t>
             </a:fld>
             <a:endParaRPr lang="en-US"/>
           </a:p>
@@ -771,7 +772,7 @@
           <a:p>
             <a:fld id="{FDA4065B-48DF-45A0-8421-A0137D67E07E}" type="datetimeFigureOut">
               <a:rPr lang="en-US" smtClean="0"/>
-              <a:t>10/20/2023</a:t>
+              <a:t>11/18/2023</a:t>
             </a:fld>
             <a:endParaRPr lang="en-US"/>
           </a:p>
@@ -1017,7 +1018,7 @@
           <a:p>
             <a:fld id="{FDA4065B-48DF-45A0-8421-A0137D67E07E}" type="datetimeFigureOut">
               <a:rPr lang="en-US" smtClean="0"/>
-              <a:t>10/20/2023</a:t>
+              <a:t>11/18/2023</a:t>
             </a:fld>
             <a:endParaRPr lang="en-US"/>
           </a:p>
@@ -1249,7 +1250,7 @@
           <a:p>
             <a:fld id="{FDA4065B-48DF-45A0-8421-A0137D67E07E}" type="datetimeFigureOut">
               <a:rPr lang="en-US" smtClean="0"/>
-              <a:t>10/20/2023</a:t>
+              <a:t>11/18/2023</a:t>
             </a:fld>
             <a:endParaRPr lang="en-US"/>
           </a:p>
@@ -1616,7 +1617,7 @@
           <a:p>
             <a:fld id="{FDA4065B-48DF-45A0-8421-A0137D67E07E}" type="datetimeFigureOut">
               <a:rPr lang="en-US" smtClean="0"/>
-              <a:t>10/20/2023</a:t>
+              <a:t>11/18/2023</a:t>
             </a:fld>
             <a:endParaRPr lang="en-US"/>
           </a:p>
@@ -1734,7 +1735,7 @@
           <a:p>
             <a:fld id="{FDA4065B-48DF-45A0-8421-A0137D67E07E}" type="datetimeFigureOut">
               <a:rPr lang="en-US" smtClean="0"/>
-              <a:t>10/20/2023</a:t>
+              <a:t>11/18/2023</a:t>
             </a:fld>
             <a:endParaRPr lang="en-US"/>
           </a:p>
@@ -1829,7 +1830,7 @@
           <a:p>
             <a:fld id="{FDA4065B-48DF-45A0-8421-A0137D67E07E}" type="datetimeFigureOut">
               <a:rPr lang="en-US" smtClean="0"/>
-              <a:t>10/20/2023</a:t>
+              <a:t>11/18/2023</a:t>
             </a:fld>
             <a:endParaRPr lang="en-US"/>
           </a:p>
@@ -2106,7 +2107,7 @@
           <a:p>
             <a:fld id="{FDA4065B-48DF-45A0-8421-A0137D67E07E}" type="datetimeFigureOut">
               <a:rPr lang="en-US" smtClean="0"/>
-              <a:t>10/20/2023</a:t>
+              <a:t>11/18/2023</a:t>
             </a:fld>
             <a:endParaRPr lang="en-US"/>
           </a:p>
@@ -2359,7 +2360,7 @@
           <a:p>
             <a:fld id="{FDA4065B-48DF-45A0-8421-A0137D67E07E}" type="datetimeFigureOut">
               <a:rPr lang="en-US" smtClean="0"/>
-              <a:t>10/20/2023</a:t>
+              <a:t>11/18/2023</a:t>
             </a:fld>
             <a:endParaRPr lang="en-US"/>
           </a:p>
@@ -2572,7 +2573,7 @@
           <a:p>
             <a:fld id="{FDA4065B-48DF-45A0-8421-A0137D67E07E}" type="datetimeFigureOut">
               <a:rPr lang="en-US" smtClean="0"/>
-              <a:t>10/20/2023</a:t>
+              <a:t>11/18/2023</a:t>
             </a:fld>
             <a:endParaRPr lang="en-US"/>
           </a:p>
@@ -3069,6 +3070,181 @@
 </p:sld>
 </file>
 
+<file path=ppt/slides/slide10.xml><?xml version="1.0" encoding="utf-8"?>
+<p:sld xmlns:a="http://schemas.openxmlformats.org/drawingml/2006/main" xmlns:r="http://schemas.openxmlformats.org/officeDocument/2006/relationships" xmlns:p="http://schemas.openxmlformats.org/presentationml/2006/main">
+  <p:cSld>
+    <p:spTree>
+      <p:nvGrpSpPr>
+        <p:cNvPr id="1" name=""/>
+        <p:cNvGrpSpPr/>
+        <p:nvPr/>
+      </p:nvGrpSpPr>
+      <p:grpSpPr>
+        <a:xfrm>
+          <a:off x="0" y="0"/>
+          <a:ext cx="0" cy="0"/>
+          <a:chOff x="0" y="0"/>
+          <a:chExt cx="0" cy="0"/>
+        </a:xfrm>
+      </p:grpSpPr>
+      <p:sp>
+        <p:nvSpPr>
+          <p:cNvPr id="2" name="Title 1"/>
+          <p:cNvSpPr>
+            <a:spLocks noGrp="1"/>
+          </p:cNvSpPr>
+          <p:nvPr>
+            <p:ph type="title"/>
+          </p:nvPr>
+        </p:nvSpPr>
+        <p:spPr/>
+        <p:txBody>
+          <a:bodyPr/>
+          <a:lstStyle/>
+          <a:p>
+            <a:r>
+              <a:rPr lang="en-US" dirty="0" smtClean="0"/>
+              <a:t>Limited Operators for structure and union variables </a:t>
+            </a:r>
+            <a:endParaRPr lang="en-US" dirty="0"/>
+          </a:p>
+        </p:txBody>
+      </p:sp>
+      <p:sp>
+        <p:nvSpPr>
+          <p:cNvPr id="3" name="Content Placeholder 2"/>
+          <p:cNvSpPr>
+            <a:spLocks noGrp="1"/>
+          </p:cNvSpPr>
+          <p:nvPr>
+            <p:ph idx="1"/>
+          </p:nvPr>
+        </p:nvSpPr>
+        <p:spPr/>
+        <p:txBody>
+          <a:bodyPr/>
+          <a:lstStyle/>
+          <a:p>
+            <a:r>
+              <a:rPr lang="en-US" dirty="0" smtClean="0"/>
+              <a:t>Both allow the </a:t>
+            </a:r>
+            <a:r>
+              <a:rPr lang="en-US" dirty="0" smtClean="0">
+                <a:latin typeface="Courier New" panose="02070309020205020404" pitchFamily="49" charset="0"/>
+                <a:cs typeface="Courier New" panose="02070309020205020404" pitchFamily="49" charset="0"/>
+              </a:rPr>
+              <a:t>  ∙  </a:t>
+            </a:r>
+            <a:r>
+              <a:rPr lang="en-US" dirty="0" smtClean="0"/>
+              <a:t>  and the</a:t>
+            </a:r>
+            <a:r>
+              <a:rPr lang="en-US" dirty="0" smtClean="0">
+                <a:latin typeface="Courier New" panose="02070309020205020404" pitchFamily="49" charset="0"/>
+                <a:cs typeface="Courier New" panose="02070309020205020404" pitchFamily="49" charset="0"/>
+              </a:rPr>
+              <a:t>  -&gt; </a:t>
+            </a:r>
+            <a:r>
+              <a:rPr lang="en-US" dirty="0" smtClean="0"/>
+              <a:t>  for member access.</a:t>
+            </a:r>
+          </a:p>
+          <a:p>
+            <a:r>
+              <a:rPr lang="en-US" dirty="0" smtClean="0"/>
+              <a:t>Assignment to the same type is allowed.</a:t>
+            </a:r>
+          </a:p>
+          <a:p>
+            <a:pPr lvl="1"/>
+            <a:r>
+              <a:rPr lang="en-US" dirty="0" smtClean="0"/>
+              <a:t>So    </a:t>
+            </a:r>
+            <a:r>
+              <a:rPr lang="en-US" dirty="0" smtClean="0">
+                <a:latin typeface="Courier New" panose="02070309020205020404" pitchFamily="49" charset="0"/>
+                <a:cs typeface="Courier New" panose="02070309020205020404" pitchFamily="49" charset="0"/>
+              </a:rPr>
+              <a:t> a  =  b   </a:t>
+            </a:r>
+            <a:r>
+              <a:rPr lang="en-US" dirty="0" smtClean="0"/>
+              <a:t>         is valid if a   and  b are both of type </a:t>
+            </a:r>
+            <a:r>
+              <a:rPr lang="en-US" dirty="0" err="1" smtClean="0">
+                <a:latin typeface="Courier New" panose="02070309020205020404" pitchFamily="49" charset="0"/>
+                <a:cs typeface="Courier New" panose="02070309020205020404" pitchFamily="49" charset="0"/>
+              </a:rPr>
+              <a:t>struct</a:t>
+            </a:r>
+            <a:r>
+              <a:rPr lang="en-US" dirty="0" smtClean="0">
+                <a:latin typeface="Courier New" panose="02070309020205020404" pitchFamily="49" charset="0"/>
+                <a:cs typeface="Courier New" panose="02070309020205020404" pitchFamily="49" charset="0"/>
+              </a:rPr>
+              <a:t> student</a:t>
+            </a:r>
+            <a:r>
+              <a:rPr lang="en-US" dirty="0" smtClean="0"/>
+              <a:t> and it results in the fields being identical in value.</a:t>
+            </a:r>
+          </a:p>
+          <a:p>
+            <a:r>
+              <a:rPr lang="en-US" dirty="0" smtClean="0"/>
+              <a:t>Copies are passed as parameters and return values. (see </a:t>
+            </a:r>
+            <a:r>
+              <a:rPr lang="en-US" dirty="0" err="1" smtClean="0"/>
+              <a:t>simple_struct.c</a:t>
+            </a:r>
+            <a:r>
+              <a:rPr lang="en-US" dirty="0" smtClean="0"/>
+              <a:t>) </a:t>
+            </a:r>
+          </a:p>
+          <a:p>
+            <a:pPr lvl="1"/>
+            <a:r>
+              <a:rPr lang="en-US" dirty="0" smtClean="0"/>
+              <a:t>Just to emphasize, this is like our basic types and (</a:t>
+            </a:r>
+            <a:r>
+              <a:rPr lang="en-US" i="1" dirty="0" smtClean="0"/>
+              <a:t>unlike arrays, where we cannot do an assignment, pass a copy as a parameter or return a copy.)</a:t>
+            </a:r>
+            <a:r>
+              <a:rPr lang="en-US" dirty="0" smtClean="0"/>
+              <a:t> </a:t>
+            </a:r>
+          </a:p>
+          <a:p>
+            <a:r>
+              <a:rPr lang="en-US" dirty="0" smtClean="0"/>
+              <a:t>We cannot use any other operators (e.g., we cannot check a == b , or use any arithmetic operator) on a structure or union.</a:t>
+            </a:r>
+            <a:endParaRPr lang="en-US" dirty="0"/>
+          </a:p>
+        </p:txBody>
+      </p:sp>
+    </p:spTree>
+    <p:extLst>
+      <p:ext uri="{BB962C8B-B14F-4D97-AF65-F5344CB8AC3E}">
+        <p14:creationId xmlns:p14="http://schemas.microsoft.com/office/powerpoint/2010/main" val="3228061737"/>
+      </p:ext>
+    </p:extLst>
+  </p:cSld>
+  <p:clrMapOvr>
+    <a:masterClrMapping/>
+  </p:clrMapOvr>
+</p:sld>
+</file>
+
 <file path=ppt/slides/slide2.xml><?xml version="1.0" encoding="utf-8"?>
 <p:sld xmlns:a="http://schemas.openxmlformats.org/drawingml/2006/main" xmlns:r="http://schemas.openxmlformats.org/officeDocument/2006/relationships" xmlns:p="http://schemas.openxmlformats.org/presentationml/2006/main">
   <p:cSld>
@@ -5185,14 +5361,7 @@
                 <a:latin typeface="Courier New" panose="02070309020205020404" pitchFamily="49" charset="0"/>
                 <a:cs typeface="Courier New" panose="02070309020205020404" pitchFamily="49" charset="0"/>
               </a:rPr>
-              <a:t> </a:t>
-            </a:r>
-            <a:r>
-              <a:rPr lang="en-US" sz="2000" dirty="0" smtClean="0">
-                <a:latin typeface="Courier New" panose="02070309020205020404" pitchFamily="49" charset="0"/>
-                <a:cs typeface="Courier New" panose="02070309020205020404" pitchFamily="49" charset="0"/>
-              </a:rPr>
-              <a:t>student </a:t>
+              <a:t> student </a:t>
             </a:r>
             <a:r>
               <a:rPr lang="en-US" sz="2000" b="1" dirty="0" err="1" smtClean="0">
@@ -5240,14 +5409,7 @@
                 <a:latin typeface="Courier New" panose="02070309020205020404" pitchFamily="49" charset="0"/>
                 <a:cs typeface="Courier New" panose="02070309020205020404" pitchFamily="49" charset="0"/>
               </a:rPr>
-              <a:t>[10</a:t>
-            </a:r>
-            <a:r>
-              <a:rPr lang="en-US" sz="2000" dirty="0" smtClean="0">
-                <a:latin typeface="Courier New" panose="02070309020205020404" pitchFamily="49" charset="0"/>
-                <a:cs typeface="Courier New" panose="02070309020205020404" pitchFamily="49" charset="0"/>
-              </a:rPr>
-              <a:t>];</a:t>
+              <a:t>[10];</a:t>
             </a:r>
           </a:p>
           <a:p>
@@ -5864,14 +6026,7 @@
                 <a:latin typeface="Courier New" panose="02070309020205020404" pitchFamily="49" charset="0"/>
                 <a:cs typeface="Courier New" panose="02070309020205020404" pitchFamily="49" charset="0"/>
               </a:rPr>
-              <a:t>=0</a:t>
-            </a:r>
-            <a:r>
-              <a:rPr lang="en-US" sz="2400" dirty="0" smtClean="0">
-                <a:latin typeface="Courier New" panose="02070309020205020404" pitchFamily="49" charset="0"/>
-                <a:cs typeface="Courier New" panose="02070309020205020404" pitchFamily="49" charset="0"/>
-              </a:rPr>
-              <a:t>;</a:t>
+              <a:t>=0;</a:t>
             </a:r>
             <a:endParaRPr lang="en-US" sz="2400" dirty="0">
               <a:latin typeface="Courier New" panose="02070309020205020404" pitchFamily="49" charset="0"/>
@@ -8372,7 +8527,7 @@
             <a:spLocks noGrp="1"/>
           </p:cNvSpPr>
           <p:nvPr>
-            <p:ph sz="half" idx="1"/>
+            <p:ph idx="1"/>
           </p:nvPr>
         </p:nvSpPr>
         <p:spPr/>
@@ -8554,7 +8709,7 @@
                 <a:latin typeface="Courier New" panose="02070309020205020404" pitchFamily="49" charset="0"/>
                 <a:cs typeface="Courier New" panose="02070309020205020404" pitchFamily="49" charset="0"/>
               </a:rPr>
-              <a:t>s_id</a:t>
+              <a:t>s_id.alnum</a:t>
             </a:r>
             <a:r>
               <a:rPr lang="en-US" sz="2400" dirty="0" smtClean="0">
@@ -8562,6 +8717,13 @@
                 <a:cs typeface="Courier New" panose="02070309020205020404" pitchFamily="49" charset="0"/>
               </a:rPr>
               <a:t>);</a:t>
+            </a:r>
+            <a:r>
+              <a:rPr lang="en-US" sz="2400" dirty="0" smtClean="0">
+                <a:latin typeface="Courier New" panose="02070309020205020404" pitchFamily="49" charset="0"/>
+                <a:cs typeface="Courier New" panose="02070309020205020404" pitchFamily="49" charset="0"/>
+              </a:rPr>
+              <a:t/>
             </a:r>
             <a:br>
               <a:rPr lang="en-US" sz="2400" dirty="0" smtClean="0">
@@ -8643,13 +8805,13 @@
             <a:spLocks noGrp="1"/>
           </p:cNvSpPr>
           <p:nvPr>
-            <p:ph sz="half" idx="2"/>
+            <p:ph sz="half" idx="4294967295"/>
           </p:nvPr>
         </p:nvSpPr>
         <p:spPr>
           <a:xfrm>
-            <a:off x="6172199" y="1825625"/>
-            <a:ext cx="5672797" cy="4351338"/>
+            <a:off x="6519863" y="1825625"/>
+            <a:ext cx="5672137" cy="4351338"/>
           </a:xfrm>
         </p:spPr>
         <p:txBody>

</xml_diff>